<commit_message>
presentation: add some notes
</commit_message>
<xml_diff>
--- a/Präsentation/presentation.pptx
+++ b/Präsentation/presentation.pptx
@@ -152,7 +152,7 @@
 </file>
 
 <file path=ppt/charts/chart1.xml><?xml version="1.0" encoding="utf-8"?>
-<c:chartSpace xmlns:c="http://schemas.openxmlformats.org/drawingml/2006/chart" xmlns:a="http://schemas.openxmlformats.org/drawingml/2006/main" xmlns:r="http://schemas.openxmlformats.org/officeDocument/2006/relationships" xmlns:c16r2="http://schemas.microsoft.com/office/drawing/2015/06/chart">
+<c:chartSpace xmlns:c="http://schemas.openxmlformats.org/drawingml/2006/chart" xmlns:a="http://schemas.openxmlformats.org/drawingml/2006/main" xmlns:r="http://schemas.openxmlformats.org/officeDocument/2006/relationships">
   <c:date1904 val="0"/>
   <c:lang val="de-DE"/>
   <c:roundedCorners val="0"/>
@@ -201,7 +201,7 @@
               </a:ln>
               <a:effectLst/>
             </c:spPr>
-            <c:extLst>
+            <c:extLst xmlns:c16r2="http://schemas.microsoft.com/office/drawing/2015/06/chart">
               <c:ext xmlns:c16="http://schemas.microsoft.com/office/drawing/2014/chart" uri="{C3380CC4-5D6E-409C-BE32-E72D297353CC}">
                 <c16:uniqueId val="{00000002-5E61-4A2E-9C16-C2FEFDFBB977}"/>
               </c:ext>
@@ -223,7 +223,7 @@
               </a:ln>
               <a:effectLst/>
             </c:spPr>
-            <c:extLst>
+            <c:extLst xmlns:c16r2="http://schemas.microsoft.com/office/drawing/2015/06/chart">
               <c:ext xmlns:c16="http://schemas.microsoft.com/office/drawing/2014/chart" uri="{C3380CC4-5D6E-409C-BE32-E72D297353CC}">
                 <c16:uniqueId val="{00000001-5E61-4A2E-9C16-C2FEFDFBB977}"/>
               </c:ext>
@@ -250,15 +250,15 @@
                 <c:formatCode>General</c:formatCode>
                 <c:ptCount val="2"/>
                 <c:pt idx="0">
-                  <c:v>1662</c:v>
+                  <c:v>1662.0</c:v>
                 </c:pt>
                 <c:pt idx="1">
-                  <c:v>5474</c:v>
+                  <c:v>5474.0</c:v>
                 </c:pt>
               </c:numCache>
             </c:numRef>
           </c:val>
-          <c:extLst>
+          <c:extLst xmlns:c16r2="http://schemas.microsoft.com/office/drawing/2015/06/chart">
             <c:ext xmlns:c16="http://schemas.microsoft.com/office/drawing/2014/chart" uri="{C3380CC4-5D6E-409C-BE32-E72D297353CC}">
               <c16:uniqueId val="{00000000-5E61-4A2E-9C16-C2FEFDFBB977}"/>
             </c:ext>
@@ -952,7 +952,7 @@
           <a:p>
             <a:fld id="{C018CAB8-1F61-49D8-8340-04BCC7D2C15D}" type="datetimeFigureOut">
               <a:rPr lang="de-LU" smtClean="0"/>
-              <a:t>26.10.2016</a:t>
+              <a:t>27.10.16</a:t>
             </a:fld>
             <a:endParaRPr lang="de-LU"/>
           </a:p>
@@ -1118,7 +1118,7 @@
           <a:p>
             <a:fld id="{8B9FABE9-F223-40F4-B29B-AF42B1456244}" type="datetimeFigureOut">
               <a:rPr lang="de-LU" smtClean="0"/>
-              <a:t>26.10.2016</a:t>
+              <a:t>27.10.16</a:t>
             </a:fld>
             <a:endParaRPr lang="de-LU"/>
           </a:p>
@@ -1431,7 +1431,18 @@
           <a:bodyPr/>
           <a:lstStyle/>
           <a:p>
-            <a:endParaRPr lang="de-DE"/>
+            <a:r>
+              <a:rPr lang="de-DE" sz="1200" kern="1200" dirty="0" smtClean="0">
+                <a:solidFill>
+                  <a:schemeClr val="tx1"/>
+                </a:solidFill>
+                <a:latin typeface="+mn-lt"/>
+                <a:ea typeface="+mn-ea"/>
+                <a:cs typeface="+mn-cs"/>
+              </a:rPr>
+              <a:t>AGSBS: Arbeitsgruppe Studium für Blinde und Sehbehinderte</a:t>
+            </a:r>
+            <a:endParaRPr lang="de-DE" dirty="0"/>
           </a:p>
         </p:txBody>
       </p:sp>
@@ -1520,8 +1531,8 @@
               <a:buNone/>
             </a:pPr>
             <a:r>
-              <a:rPr lang="de-DE" baseline="0" dirty="0"/>
-              <a:t>GIT</a:t>
+              <a:rPr lang="de-DE" baseline="0" dirty="0" smtClean="0"/>
+              <a:t>Live-Vorschau:</a:t>
             </a:r>
           </a:p>
           <a:p>
@@ -1530,16 +1541,8 @@
               <a:buChar char="-"/>
             </a:pPr>
             <a:r>
-              <a:rPr lang="de-DE" baseline="0" dirty="0"/>
-              <a:t>In Einstellungen des </a:t>
-            </a:r>
-            <a:r>
-              <a:rPr lang="de-DE" baseline="0" dirty="0" err="1"/>
-              <a:t>Plugins</a:t>
-            </a:r>
-            <a:r>
-              <a:rPr lang="de-DE" baseline="0" dirty="0"/>
-              <a:t> kann die Integration deaktiviert werden, ansonsten:</a:t>
+              <a:rPr lang="de-DE" baseline="0" dirty="0" smtClean="0"/>
+              <a:t>Man kann sofort sehen was passiert</a:t>
             </a:r>
           </a:p>
           <a:p>
@@ -1548,15 +1551,71 @@
               <a:buChar char="-"/>
             </a:pPr>
             <a:r>
-              <a:rPr lang="de-DE" baseline="0" dirty="0"/>
-              <a:t>Beim Speichern wird an das Committen erinnert</a:t>
-            </a:r>
+              <a:rPr lang="de-DE" baseline="0" dirty="0" smtClean="0"/>
+              <a:t>Latex </a:t>
+            </a:r>
+            <a:r>
+              <a:rPr lang="de-DE" baseline="0" dirty="0" err="1" smtClean="0"/>
+              <a:t>Formeluntersützung</a:t>
+            </a:r>
+            <a:endParaRPr lang="de-DE" baseline="0" dirty="0" smtClean="0"/>
+          </a:p>
+          <a:p>
+            <a:pPr marL="0" indent="0">
+              <a:buFontTx/>
+              <a:buNone/>
+            </a:pPr>
+            <a:endParaRPr lang="de-DE" baseline="0" dirty="0" smtClean="0"/>
+          </a:p>
+          <a:p>
+            <a:pPr marL="0" indent="0">
+              <a:buFontTx/>
+              <a:buNone/>
+            </a:pPr>
+            <a:r>
+              <a:rPr lang="de-DE" baseline="0" dirty="0" smtClean="0"/>
+              <a:t>GIT</a:t>
+            </a:r>
+            <a:endParaRPr lang="de-DE" baseline="0" dirty="0"/>
           </a:p>
           <a:p>
             <a:pPr marL="171450" indent="-171450">
               <a:buFontTx/>
               <a:buChar char="-"/>
             </a:pPr>
+            <a:r>
+              <a:rPr lang="de-DE" baseline="0" dirty="0"/>
+              <a:t>In Einstellungen des </a:t>
+            </a:r>
+            <a:r>
+              <a:rPr lang="de-DE" baseline="0" dirty="0" err="1"/>
+              <a:t>Plugins</a:t>
+            </a:r>
+            <a:r>
+              <a:rPr lang="de-DE" baseline="0" dirty="0"/>
+              <a:t> kann die Integration deaktiviert werden, ansonsten:</a:t>
+            </a:r>
+          </a:p>
+          <a:p>
+            <a:pPr marL="171450" indent="-171450">
+              <a:buFontTx/>
+              <a:buChar char="-"/>
+            </a:pPr>
+            <a:r>
+              <a:rPr lang="de-DE" baseline="0" dirty="0"/>
+              <a:t>Beim Speichern wird an das Committen </a:t>
+            </a:r>
+            <a:r>
+              <a:rPr lang="de-DE" baseline="0" dirty="0" smtClean="0"/>
+              <a:t>erinnert</a:t>
+            </a:r>
+            <a:endParaRPr lang="de-DE" baseline="0" dirty="0"/>
+          </a:p>
+          <a:p>
+            <a:pPr marL="171450" indent="-171450">
+              <a:buFontTx/>
+              <a:buChar char="-"/>
+            </a:pPr>
             <a:endParaRPr lang="de-DE" baseline="0" dirty="0"/>
           </a:p>
           <a:p>
@@ -1566,7 +1625,7 @@
             </a:pPr>
             <a:r>
               <a:rPr lang="de-DE" baseline="0" dirty="0"/>
-              <a:t>Live-Vorschau:</a:t>
+              <a:t>Shortcuts für erfahrene Benutzer</a:t>
             </a:r>
           </a:p>
           <a:p>
@@ -1576,7 +1635,7 @@
             </a:pPr>
             <a:r>
               <a:rPr lang="de-DE" baseline="0" dirty="0"/>
-              <a:t>Man kann sofort sehen was passiert</a:t>
+              <a:t>Jede Funktion kann über einen Tastaturkurzbefehl aufgerufen werden</a:t>
             </a:r>
           </a:p>
           <a:p>
@@ -1585,14 +1644,13 @@
               <a:buChar char="-"/>
             </a:pPr>
             <a:r>
+              <a:rPr lang="de-DE" baseline="0" dirty="0" err="1"/>
+              <a:t>Tooltips</a:t>
+            </a:r>
+            <a:r>
               <a:rPr lang="de-DE" baseline="0" dirty="0"/>
-              <a:t>Latex </a:t>
-            </a:r>
-            <a:r>
-              <a:rPr lang="de-DE" baseline="0" dirty="0" err="1"/>
-              <a:t>Formeluntersützung</a:t>
-            </a:r>
-            <a:endParaRPr lang="de-DE" baseline="0" dirty="0"/>
+              <a:t> für schnelle Lernkurve</a:t>
+            </a:r>
           </a:p>
           <a:p>
             <a:pPr marL="171450" indent="-171450">
@@ -1602,20 +1660,23 @@
             <a:endParaRPr lang="de-DE" baseline="0" dirty="0"/>
           </a:p>
           <a:p>
+            <a:pPr marL="0" indent="0">
+              <a:buFontTx/>
+              <a:buNone/>
+            </a:pPr>
+            <a:r>
+              <a:rPr lang="de-DE" baseline="0" dirty="0"/>
+              <a:t>Unterstützung in der Ausführung einzelner Arbeitsschritte</a:t>
+            </a:r>
+          </a:p>
+          <a:p>
             <a:pPr marL="171450" indent="-171450">
               <a:buFontTx/>
               <a:buChar char="-"/>
             </a:pPr>
-            <a:endParaRPr lang="de-DE" baseline="0" dirty="0"/>
-          </a:p>
-          <a:p>
-            <a:pPr marL="0" indent="0">
-              <a:buFontTx/>
-              <a:buNone/>
-            </a:pPr>
             <a:r>
               <a:rPr lang="de-DE" baseline="0" dirty="0"/>
-              <a:t>Shortcuts für erfahrene Benutzer</a:t>
+              <a:t>Commit Abfrage beim Speichern</a:t>
             </a:r>
           </a:p>
           <a:p>
@@ -1625,62 +1686,27 @@
             </a:pPr>
             <a:r>
               <a:rPr lang="de-DE" baseline="0" dirty="0"/>
-              <a:t>Jede Funktion kann über einen Tastaturkurzbefehl aufgerufen werden</a:t>
-            </a:r>
-          </a:p>
-          <a:p>
-            <a:pPr marL="171450" indent="-171450">
-              <a:buFontTx/>
-              <a:buChar char="-"/>
-            </a:pPr>
-            <a:r>
-              <a:rPr lang="de-DE" baseline="0" dirty="0" err="1"/>
-              <a:t>Tooltips</a:t>
-            </a:r>
-            <a:r>
-              <a:rPr lang="de-DE" baseline="0" dirty="0"/>
-              <a:t> für schnelle Lernkurve</a:t>
-            </a:r>
-          </a:p>
-          <a:p>
-            <a:pPr marL="171450" indent="-171450">
-              <a:buFontTx/>
-              <a:buChar char="-"/>
-            </a:pPr>
-            <a:endParaRPr lang="de-DE" baseline="0" dirty="0"/>
-          </a:p>
-          <a:p>
-            <a:pPr marL="0" indent="0">
-              <a:buFontTx/>
-              <a:buNone/>
-            </a:pPr>
-            <a:r>
-              <a:rPr lang="de-DE" baseline="0" dirty="0"/>
-              <a:t>Unterstützung in der Ausführung einzelner Arbeitsschritte</a:t>
-            </a:r>
-          </a:p>
-          <a:p>
-            <a:pPr marL="171450" indent="-171450">
-              <a:buFontTx/>
-              <a:buChar char="-"/>
-            </a:pPr>
-            <a:r>
-              <a:rPr lang="de-DE" baseline="0" dirty="0"/>
-              <a:t>Commit Abfrage beim Speichern</a:t>
-            </a:r>
-          </a:p>
-          <a:p>
-            <a:pPr marL="171450" indent="-171450">
-              <a:buFontTx/>
-              <a:buChar char="-"/>
-            </a:pPr>
-            <a:r>
-              <a:rPr lang="de-DE" baseline="0" dirty="0"/>
               <a:t>beim Speichern wird überprüft mit </a:t>
             </a:r>
             <a:r>
-              <a:rPr lang="de-DE" baseline="0" dirty="0" err="1"/>
-              <a:t>mistkerl</a:t>
+              <a:rPr lang="de-DE" baseline="0" dirty="0" err="1" smtClean="0"/>
+              <a:t>matuc</a:t>
+            </a:r>
+            <a:r>
+              <a:rPr lang="de-DE" baseline="0" dirty="0" smtClean="0"/>
+              <a:t> eigenem </a:t>
+            </a:r>
+            <a:r>
+              <a:rPr lang="de-DE" baseline="0" dirty="0" err="1" smtClean="0"/>
+              <a:t>markdown</a:t>
+            </a:r>
+            <a:r>
+              <a:rPr lang="de-DE" baseline="0" dirty="0" smtClean="0"/>
+              <a:t> </a:t>
+            </a:r>
+            <a:r>
+              <a:rPr lang="de-DE" baseline="0" dirty="0" err="1" smtClean="0"/>
+              <a:t>linter</a:t>
             </a:r>
             <a:endParaRPr lang="de-DE" baseline="0" dirty="0"/>
           </a:p>
@@ -2932,9 +2958,17 @@
           <a:bodyPr/>
           <a:lstStyle/>
           <a:p>
-            <a:r>
-              <a:rPr lang="de-DE" dirty="0"/>
-              <a:t>Plattformübergreifend:</a:t>
+            <a:pPr marL="0" indent="0">
+              <a:buFontTx/>
+              <a:buNone/>
+            </a:pPr>
+            <a:r>
+              <a:rPr lang="de-DE" baseline="0" dirty="0" smtClean="0"/>
+              <a:t>Fantastischer </a:t>
+            </a:r>
+            <a:r>
+              <a:rPr lang="de-DE" baseline="0" dirty="0"/>
+              <a:t>Support:</a:t>
             </a:r>
           </a:p>
           <a:p>
@@ -2943,12 +2977,8 @@
               <a:buChar char="-"/>
             </a:pPr>
             <a:r>
-              <a:rPr lang="de-DE" baseline="0" dirty="0" err="1"/>
-              <a:t>Läut</a:t>
-            </a:r>
-            <a:r>
               <a:rPr lang="de-DE" baseline="0" dirty="0"/>
-              <a:t> auf allen OS</a:t>
+              <a:t>Geile Community</a:t>
             </a:r>
           </a:p>
           <a:p>
@@ -2956,7 +2986,97 @@
               <a:buFontTx/>
               <a:buChar char="-"/>
             </a:pPr>
-            <a:endParaRPr lang="de-DE" baseline="0" dirty="0"/>
+            <a:r>
+              <a:rPr lang="de-DE" baseline="0" dirty="0" err="1"/>
+              <a:t>Rüsch</a:t>
+            </a:r>
+            <a:r>
+              <a:rPr lang="de-DE" baseline="0" dirty="0"/>
+              <a:t> gute </a:t>
+            </a:r>
+            <a:r>
+              <a:rPr lang="de-DE" baseline="0" dirty="0" smtClean="0"/>
+              <a:t>Doku</a:t>
+            </a:r>
+          </a:p>
+          <a:p>
+            <a:pPr marL="171450" indent="-171450">
+              <a:buFontTx/>
+              <a:buChar char="-"/>
+            </a:pPr>
+            <a:endParaRPr lang="de-DE" baseline="0" dirty="0" smtClean="0"/>
+          </a:p>
+          <a:p>
+            <a:pPr marL="0" indent="0">
+              <a:buFont typeface="Arial" charset="0"/>
+              <a:buNone/>
+            </a:pPr>
+            <a:r>
+              <a:rPr lang="de-DE" baseline="0" dirty="0" smtClean="0"/>
+              <a:t>Paketmanager:</a:t>
+            </a:r>
+          </a:p>
+          <a:p>
+            <a:pPr marL="171450" indent="-171450">
+              <a:buFontTx/>
+              <a:buChar char="-"/>
+            </a:pPr>
+            <a:r>
+              <a:rPr lang="de-DE" baseline="0" dirty="0" smtClean="0"/>
+              <a:t>Einfach</a:t>
+            </a:r>
+          </a:p>
+          <a:p>
+            <a:pPr marL="171450" indent="-171450">
+              <a:buFontTx/>
+              <a:buChar char="-"/>
+            </a:pPr>
+            <a:r>
+              <a:rPr lang="de-DE" baseline="0" dirty="0" smtClean="0"/>
+              <a:t>Cool</a:t>
+            </a:r>
+          </a:p>
+          <a:p>
+            <a:pPr marL="171450" indent="-171450">
+              <a:buFontTx/>
+              <a:buChar char="-"/>
+            </a:pPr>
+            <a:r>
+              <a:rPr lang="de-DE" baseline="0" dirty="0" err="1" smtClean="0"/>
+              <a:t>Node.js</a:t>
+            </a:r>
+            <a:r>
+              <a:rPr lang="de-DE" baseline="0" dirty="0" smtClean="0"/>
+              <a:t> </a:t>
+            </a:r>
+            <a:r>
+              <a:rPr lang="de-DE" baseline="0" dirty="0" err="1" smtClean="0"/>
+              <a:t>packages</a:t>
+            </a:r>
+            <a:r>
+              <a:rPr lang="de-DE" baseline="0" dirty="0" smtClean="0"/>
+              <a:t> und </a:t>
+            </a:r>
+            <a:r>
+              <a:rPr lang="de-DE" baseline="0" dirty="0" err="1" smtClean="0"/>
+              <a:t>atom</a:t>
+            </a:r>
+            <a:r>
+              <a:rPr lang="de-DE" baseline="0" dirty="0" smtClean="0"/>
+              <a:t> </a:t>
+            </a:r>
+            <a:r>
+              <a:rPr lang="de-DE" baseline="0" dirty="0" err="1" smtClean="0"/>
+              <a:t>packages</a:t>
+            </a:r>
+            <a:endParaRPr lang="de-DE" baseline="0" dirty="0" smtClean="0"/>
+          </a:p>
+          <a:p>
+            <a:pPr marL="171450" indent="-171450">
+              <a:buFontTx/>
+              <a:buChar char="-"/>
+            </a:pPr>
+            <a:endParaRPr lang="de-DE" baseline="0" dirty="0" smtClean="0"/>
           </a:p>
           <a:p>
             <a:pPr marL="0" indent="0">
@@ -2964,57 +3084,11 @@
               <a:buNone/>
             </a:pPr>
             <a:r>
-              <a:rPr lang="de-DE" baseline="0" dirty="0" err="1"/>
-              <a:t>Git</a:t>
-            </a:r>
-            <a:r>
-              <a:rPr lang="de-DE" baseline="0" dirty="0"/>
-              <a:t>-Integration:</a:t>
-            </a:r>
-          </a:p>
-          <a:p>
-            <a:pPr marL="171450" indent="-171450">
-              <a:buFontTx/>
-              <a:buChar char="-"/>
-            </a:pPr>
-            <a:r>
-              <a:rPr lang="de-DE" baseline="0" dirty="0"/>
-              <a:t>Von Anfang an am Start</a:t>
-            </a:r>
-          </a:p>
-          <a:p>
-            <a:pPr marL="171450" indent="-171450">
-              <a:buFontTx/>
-              <a:buChar char="-"/>
-            </a:pPr>
-            <a:r>
-              <a:rPr lang="de-DE" baseline="0" dirty="0"/>
-              <a:t>Kostenlos, für Sublime nur gegen </a:t>
-            </a:r>
-            <a:r>
-              <a:rPr lang="de-DE" baseline="0" dirty="0" err="1"/>
-              <a:t>Entgeld</a:t>
-            </a:r>
-            <a:endParaRPr lang="de-DE" baseline="0" dirty="0"/>
-          </a:p>
-          <a:p>
-            <a:pPr marL="171450" indent="-171450">
-              <a:buFontTx/>
-              <a:buChar char="-"/>
-            </a:pPr>
-            <a:endParaRPr lang="de-DE" baseline="0" dirty="0"/>
-          </a:p>
-          <a:p>
-            <a:pPr marL="0" indent="0">
-              <a:buFontTx/>
-              <a:buNone/>
-            </a:pPr>
-            <a:r>
-              <a:rPr lang="de-DE" baseline="0" dirty="0" err="1"/>
+              <a:rPr lang="de-DE" baseline="0" dirty="0" err="1" smtClean="0"/>
               <a:t>Electron</a:t>
             </a:r>
             <a:r>
-              <a:rPr lang="de-DE" baseline="0" dirty="0"/>
+              <a:rPr lang="de-DE" baseline="0" dirty="0" smtClean="0"/>
               <a:t>-Engine:</a:t>
             </a:r>
           </a:p>
@@ -3024,7 +3098,7 @@
               <a:buChar char="•"/>
             </a:pPr>
             <a:r>
-              <a:rPr lang="de-DE" sz="1200" kern="1200" dirty="0">
+              <a:rPr lang="de-DE" sz="1200" kern="1200" dirty="0" smtClean="0">
                 <a:solidFill>
                   <a:schemeClr val="tx1"/>
                 </a:solidFill>
@@ -3035,7 +3109,7 @@
               <a:t>Atom </a:t>
             </a:r>
             <a:r>
-              <a:rPr lang="de-DE" sz="1200" kern="1200" dirty="0" err="1">
+              <a:rPr lang="de-DE" sz="1200" kern="1200" dirty="0" err="1" smtClean="0">
                 <a:solidFill>
                   <a:schemeClr val="tx1"/>
                 </a:solidFill>
@@ -3046,7 +3120,7 @@
               <a:t>is</a:t>
             </a:r>
             <a:r>
-              <a:rPr lang="de-DE" sz="1200" kern="1200" dirty="0">
+              <a:rPr lang="de-DE" sz="1200" kern="1200" dirty="0" smtClean="0">
                 <a:solidFill>
                   <a:schemeClr val="tx1"/>
                 </a:solidFill>
@@ -3057,7 +3131,7 @@
               <a:t> a </a:t>
             </a:r>
             <a:r>
-              <a:rPr lang="de-DE" sz="1200" kern="1200" dirty="0" err="1">
+              <a:rPr lang="de-DE" sz="1200" kern="1200" dirty="0" err="1" smtClean="0">
                 <a:solidFill>
                   <a:schemeClr val="tx1"/>
                 </a:solidFill>
@@ -3068,7 +3142,7 @@
               <a:t>desktop</a:t>
             </a:r>
             <a:r>
-              <a:rPr lang="de-DE" sz="1200" kern="1200" dirty="0">
+              <a:rPr lang="de-DE" sz="1200" kern="1200" dirty="0" smtClean="0">
                 <a:solidFill>
                   <a:schemeClr val="tx1"/>
                 </a:solidFill>
@@ -3079,7 +3153,7 @@
               <a:t> </a:t>
             </a:r>
             <a:r>
-              <a:rPr lang="de-DE" sz="1200" kern="1200" dirty="0" err="1">
+              <a:rPr lang="de-DE" sz="1200" kern="1200" dirty="0" err="1" smtClean="0">
                 <a:solidFill>
                   <a:schemeClr val="tx1"/>
                 </a:solidFill>
@@ -3090,7 +3164,7 @@
               <a:t>application</a:t>
             </a:r>
             <a:r>
-              <a:rPr lang="de-DE" sz="1200" kern="1200" dirty="0">
+              <a:rPr lang="de-DE" sz="1200" kern="1200" dirty="0" smtClean="0">
                 <a:solidFill>
                   <a:schemeClr val="tx1"/>
                 </a:solidFill>
@@ -3101,7 +3175,7 @@
               <a:t> </a:t>
             </a:r>
             <a:r>
-              <a:rPr lang="de-DE" sz="1200" kern="1200" dirty="0" err="1">
+              <a:rPr lang="de-DE" sz="1200" kern="1200" dirty="0" err="1" smtClean="0">
                 <a:solidFill>
                   <a:schemeClr val="tx1"/>
                 </a:solidFill>
@@ -3112,7 +3186,7 @@
               <a:t>built</a:t>
             </a:r>
             <a:r>
-              <a:rPr lang="de-DE" sz="1200" kern="1200" dirty="0">
+              <a:rPr lang="de-DE" sz="1200" kern="1200" dirty="0" smtClean="0">
                 <a:solidFill>
                   <a:schemeClr val="tx1"/>
                 </a:solidFill>
@@ -3123,7 +3197,7 @@
               <a:t> </a:t>
             </a:r>
             <a:r>
-              <a:rPr lang="de-DE" sz="1200" kern="1200" dirty="0" err="1">
+              <a:rPr lang="de-DE" sz="1200" kern="1200" dirty="0" err="1" smtClean="0">
                 <a:solidFill>
                   <a:schemeClr val="tx1"/>
                 </a:solidFill>
@@ -3134,7 +3208,7 @@
               <a:t>with</a:t>
             </a:r>
             <a:r>
-              <a:rPr lang="de-DE" sz="1200" kern="1200" dirty="0">
+              <a:rPr lang="de-DE" sz="1200" kern="1200" dirty="0" smtClean="0">
                 <a:solidFill>
                   <a:schemeClr val="tx1"/>
                 </a:solidFill>
@@ -3145,7 +3219,7 @@
               <a:t> HTML, JavaScript, CSS, </a:t>
             </a:r>
             <a:r>
-              <a:rPr lang="de-DE" sz="1200" kern="1200" dirty="0" err="1">
+              <a:rPr lang="de-DE" sz="1200" kern="1200" dirty="0" err="1" smtClean="0">
                 <a:solidFill>
                   <a:schemeClr val="tx1"/>
                 </a:solidFill>
@@ -3156,7 +3230,7 @@
               <a:t>and</a:t>
             </a:r>
             <a:r>
-              <a:rPr lang="de-DE" sz="1200" kern="1200" dirty="0">
+              <a:rPr lang="de-DE" sz="1200" kern="1200" dirty="0" smtClean="0">
                 <a:solidFill>
                   <a:schemeClr val="tx1"/>
                 </a:solidFill>
@@ -3164,7 +3238,73 @@
                 <a:ea typeface="+mn-ea"/>
                 <a:cs typeface="+mn-cs"/>
               </a:rPr>
-              <a:t> Node.js Integration</a:t>
+              <a:t> </a:t>
+            </a:r>
+            <a:r>
+              <a:rPr lang="de-DE" sz="1200" kern="1200" dirty="0" err="1" smtClean="0">
+                <a:solidFill>
+                  <a:schemeClr val="tx1"/>
+                </a:solidFill>
+                <a:latin typeface="+mn-lt"/>
+                <a:ea typeface="+mn-ea"/>
+                <a:cs typeface="+mn-cs"/>
+              </a:rPr>
+              <a:t>Node.js</a:t>
+            </a:r>
+            <a:r>
+              <a:rPr lang="de-DE" sz="1200" kern="1200" dirty="0" smtClean="0">
+                <a:solidFill>
+                  <a:schemeClr val="tx1"/>
+                </a:solidFill>
+                <a:latin typeface="+mn-lt"/>
+                <a:ea typeface="+mn-ea"/>
+                <a:cs typeface="+mn-cs"/>
+              </a:rPr>
+              <a:t> Integration</a:t>
+            </a:r>
+          </a:p>
+          <a:p>
+            <a:pPr marL="171450" indent="-171450">
+              <a:buFontTx/>
+              <a:buChar char="-"/>
+            </a:pPr>
+            <a:endParaRPr lang="de-DE" baseline="0" dirty="0" smtClean="0"/>
+          </a:p>
+          <a:p>
+            <a:r>
+              <a:rPr lang="de-DE" dirty="0" smtClean="0"/>
+              <a:t>Plattformübergreifend:</a:t>
+            </a:r>
+          </a:p>
+          <a:p>
+            <a:pPr marL="171450" indent="-171450">
+              <a:buFontTx/>
+              <a:buChar char="-"/>
+            </a:pPr>
+            <a:r>
+              <a:rPr lang="de-DE" baseline="0" dirty="0" err="1" smtClean="0"/>
+              <a:t>Läut</a:t>
+            </a:r>
+            <a:r>
+              <a:rPr lang="de-DE" baseline="0" dirty="0" smtClean="0"/>
+              <a:t> auf allen OS</a:t>
+            </a:r>
+          </a:p>
+          <a:p>
+            <a:pPr marL="171450" indent="-171450">
+              <a:buFontTx/>
+              <a:buChar char="-"/>
+            </a:pPr>
+            <a:endParaRPr lang="de-DE" baseline="0" dirty="0" smtClean="0"/>
+          </a:p>
+          <a:p>
+            <a:pPr marL="0" indent="0">
+              <a:buFontTx/>
+              <a:buNone/>
+            </a:pPr>
+            <a:r>
+              <a:rPr lang="de-DE" baseline="0" dirty="0" smtClean="0"/>
+              <a:t>Package-Einstellungen:</a:t>
             </a:r>
           </a:p>
           <a:p>
@@ -3172,16 +3312,50 @@
               <a:buFont typeface="Arial" charset="0"/>
               <a:buChar char="•"/>
             </a:pPr>
-            <a:endParaRPr lang="de-DE" baseline="0" dirty="0"/>
-          </a:p>
-          <a:p>
-            <a:pPr marL="0" indent="0">
+            <a:r>
+              <a:rPr lang="de-DE" baseline="0" dirty="0" smtClean="0"/>
+              <a:t>Adaptierbarkeit</a:t>
+            </a:r>
+          </a:p>
+          <a:p>
+            <a:pPr marL="171450" indent="-171450">
               <a:buFont typeface="Arial" charset="0"/>
-              <a:buNone/>
-            </a:pPr>
-            <a:r>
-              <a:rPr lang="de-DE" baseline="0" dirty="0"/>
-              <a:t>Paketmanager:</a:t>
+              <a:buChar char="•"/>
+            </a:pPr>
+            <a:r>
+              <a:rPr lang="de-DE" baseline="0" dirty="0" smtClean="0"/>
+              <a:t>Sublime: </a:t>
+            </a:r>
+            <a:r>
+              <a:rPr lang="de-DE" baseline="0" dirty="0" err="1" smtClean="0"/>
+              <a:t>json</a:t>
+            </a:r>
+            <a:r>
+              <a:rPr lang="de-DE" baseline="0" dirty="0" smtClean="0"/>
+              <a:t> und </a:t>
+            </a:r>
+            <a:r>
+              <a:rPr lang="de-DE" baseline="0" dirty="0" err="1" smtClean="0"/>
+              <a:t>python</a:t>
+            </a:r>
+            <a:r>
+              <a:rPr lang="de-DE" baseline="0" dirty="0" smtClean="0"/>
+              <a:t> </a:t>
+            </a:r>
+            <a:r>
+              <a:rPr lang="de-DE" baseline="0" dirty="0" err="1" smtClean="0"/>
+              <a:t>mist</a:t>
+            </a:r>
+            <a:endParaRPr lang="de-DE" baseline="0" dirty="0" smtClean="0"/>
+          </a:p>
+          <a:p>
+            <a:pPr marL="171450" indent="-171450">
+              <a:buFont typeface="Arial" charset="0"/>
+              <a:buChar char="•"/>
+            </a:pPr>
+            <a:r>
+              <a:rPr lang="de-DE" baseline="0" dirty="0" smtClean="0"/>
+              <a:t>Atom: GUI</a:t>
             </a:r>
           </a:p>
           <a:p>
@@ -3189,9 +3363,20 @@
               <a:buFontTx/>
               <a:buChar char="-"/>
             </a:pPr>
-            <a:r>
-              <a:rPr lang="de-DE" baseline="0" dirty="0"/>
-              <a:t>Einfach</a:t>
+            <a:endParaRPr lang="de-DE" baseline="0" dirty="0" smtClean="0"/>
+          </a:p>
+          <a:p>
+            <a:pPr marL="0" indent="0">
+              <a:buFontTx/>
+              <a:buNone/>
+            </a:pPr>
+            <a:r>
+              <a:rPr lang="de-DE" baseline="0" dirty="0" err="1" smtClean="0"/>
+              <a:t>Git</a:t>
+            </a:r>
+            <a:r>
+              <a:rPr lang="de-DE" baseline="0" dirty="0" smtClean="0"/>
+              <a:t>-Integration:</a:t>
             </a:r>
           </a:p>
           <a:p>
@@ -3200,8 +3385,8 @@
               <a:buChar char="-"/>
             </a:pPr>
             <a:r>
-              <a:rPr lang="de-DE" baseline="0" dirty="0"/>
-              <a:t>Cool</a:t>
+              <a:rPr lang="de-DE" baseline="0" dirty="0" smtClean="0"/>
+              <a:t>Von Anfang an am Start</a:t>
             </a:r>
           </a:p>
           <a:p>
@@ -3210,139 +3395,28 @@
               <a:buChar char="-"/>
             </a:pPr>
             <a:r>
-              <a:rPr lang="de-DE" baseline="0" dirty="0"/>
-              <a:t>Node.js </a:t>
-            </a:r>
-            <a:r>
-              <a:rPr lang="de-DE" baseline="0" dirty="0" err="1"/>
-              <a:t>packages</a:t>
-            </a:r>
-            <a:r>
-              <a:rPr lang="de-DE" baseline="0" dirty="0"/>
-              <a:t> und </a:t>
-            </a:r>
-            <a:r>
-              <a:rPr lang="de-DE" baseline="0" dirty="0" err="1"/>
-              <a:t>atom</a:t>
-            </a:r>
-            <a:r>
-              <a:rPr lang="de-DE" baseline="0" dirty="0"/>
-              <a:t> </a:t>
-            </a:r>
-            <a:r>
-              <a:rPr lang="de-DE" baseline="0" dirty="0" err="1"/>
-              <a:t>packages</a:t>
-            </a:r>
-            <a:endParaRPr lang="de-DE" baseline="0" dirty="0"/>
+              <a:rPr lang="de-DE" baseline="0" dirty="0" smtClean="0"/>
+              <a:t>Kostenlos, für Sublime nur gegen </a:t>
+            </a:r>
+            <a:r>
+              <a:rPr lang="de-DE" baseline="0" dirty="0" err="1" smtClean="0"/>
+              <a:t>Entgeld</a:t>
+            </a:r>
+            <a:endParaRPr lang="de-DE" baseline="0" dirty="0" smtClean="0"/>
           </a:p>
           <a:p>
             <a:pPr marL="171450" indent="-171450">
               <a:buFontTx/>
               <a:buChar char="-"/>
             </a:pPr>
-            <a:endParaRPr lang="de-DE" baseline="0" dirty="0"/>
-          </a:p>
-          <a:p>
-            <a:pPr marL="0" indent="0">
-              <a:buFontTx/>
-              <a:buNone/>
-            </a:pPr>
-            <a:r>
-              <a:rPr lang="de-DE" baseline="0" dirty="0"/>
-              <a:t>Package-Einstellungen:</a:t>
-            </a:r>
-          </a:p>
-          <a:p>
-            <a:pPr marL="171450" indent="-171450">
-              <a:buFont typeface="Arial" charset="0"/>
-              <a:buChar char="•"/>
-            </a:pPr>
-            <a:r>
-              <a:rPr lang="de-DE" baseline="0" dirty="0"/>
-              <a:t>Adaptierbarkeit</a:t>
-            </a:r>
-          </a:p>
-          <a:p>
-            <a:pPr marL="171450" indent="-171450">
-              <a:buFont typeface="Arial" charset="0"/>
-              <a:buChar char="•"/>
-            </a:pPr>
-            <a:r>
-              <a:rPr lang="de-DE" baseline="0" dirty="0"/>
-              <a:t>Sublime: </a:t>
-            </a:r>
-            <a:r>
-              <a:rPr lang="de-DE" baseline="0" dirty="0" err="1"/>
-              <a:t>json</a:t>
-            </a:r>
-            <a:r>
-              <a:rPr lang="de-DE" baseline="0" dirty="0"/>
-              <a:t> und </a:t>
-            </a:r>
-            <a:r>
-              <a:rPr lang="de-DE" baseline="0" dirty="0" err="1"/>
-              <a:t>python</a:t>
-            </a:r>
-            <a:r>
-              <a:rPr lang="de-DE" baseline="0" dirty="0"/>
-              <a:t> </a:t>
-            </a:r>
-            <a:r>
-              <a:rPr lang="de-DE" baseline="0" dirty="0" err="1"/>
-              <a:t>mist</a:t>
-            </a:r>
-            <a:endParaRPr lang="de-DE" baseline="0" dirty="0"/>
-          </a:p>
-          <a:p>
-            <a:pPr marL="171450" indent="-171450">
-              <a:buFont typeface="Arial" charset="0"/>
-              <a:buChar char="•"/>
-            </a:pPr>
-            <a:r>
-              <a:rPr lang="de-DE" baseline="0" dirty="0"/>
-              <a:t>Atom: GUI</a:t>
-            </a:r>
-          </a:p>
-          <a:p>
-            <a:pPr marL="0" indent="0">
-              <a:buFontTx/>
-              <a:buNone/>
-            </a:pPr>
-            <a:endParaRPr lang="de-DE" baseline="0" dirty="0"/>
-          </a:p>
-          <a:p>
-            <a:pPr marL="0" indent="0">
-              <a:buFontTx/>
-              <a:buNone/>
-            </a:pPr>
-            <a:r>
-              <a:rPr lang="de-DE" baseline="0" dirty="0"/>
-              <a:t>Fantastischer Support:</a:t>
-            </a:r>
+            <a:endParaRPr lang="de-DE" baseline="0" dirty="0" smtClean="0"/>
           </a:p>
           <a:p>
             <a:pPr marL="171450" indent="-171450">
               <a:buFontTx/>
               <a:buChar char="-"/>
             </a:pPr>
-            <a:r>
-              <a:rPr lang="de-DE" baseline="0" dirty="0"/>
-              <a:t>Geile Community</a:t>
-            </a:r>
-          </a:p>
-          <a:p>
-            <a:pPr marL="171450" indent="-171450">
-              <a:buFontTx/>
-              <a:buChar char="-"/>
-            </a:pPr>
-            <a:r>
-              <a:rPr lang="de-DE" baseline="0" dirty="0" err="1"/>
-              <a:t>Rüsch</a:t>
-            </a:r>
-            <a:r>
-              <a:rPr lang="de-DE" baseline="0" dirty="0"/>
-              <a:t> gute Doku</a:t>
-            </a:r>
+            <a:endParaRPr lang="de-DE" baseline="0" dirty="0"/>
           </a:p>
           <a:p>
             <a:endParaRPr lang="de-DE" dirty="0"/>
@@ -4386,7 +4460,7 @@
           <a:p>
             <a:fld id="{852F18A7-60EF-DD48-8F37-BE93452F0A67}" type="datetime1">
               <a:rPr lang="de-DE" smtClean="0"/>
-              <a:t>26.10.2016</a:t>
+              <a:t>27.10.16</a:t>
             </a:fld>
             <a:endParaRPr lang="de-DE" dirty="0"/>
           </a:p>
@@ -4951,7 +5025,7 @@
             <a:fld id="{852F18A7-60EF-DD48-8F37-BE93452F0A67}" type="datetime1">
               <a:rPr lang="de-DE" smtClean="0"/>
               <a:pPr/>
-              <a:t>26.10.2016</a:t>
+              <a:t>27.10.16</a:t>
             </a:fld>
             <a:endParaRPr lang="de-DE" dirty="0"/>
           </a:p>
@@ -5260,7 +5334,7 @@
             <a:fld id="{852F18A7-60EF-DD48-8F37-BE93452F0A67}" type="datetime1">
               <a:rPr lang="de-DE" smtClean="0"/>
               <a:pPr/>
-              <a:t>26.10.2016</a:t>
+              <a:t>27.10.16</a:t>
             </a:fld>
             <a:endParaRPr lang="de-DE" dirty="0"/>
           </a:p>
@@ -5762,7 +5836,7 @@
             <a:fld id="{852F18A7-60EF-DD48-8F37-BE93452F0A67}" type="datetime1">
               <a:rPr lang="de-DE" smtClean="0"/>
               <a:pPr/>
-              <a:t>26.10.2016</a:t>
+              <a:t>27.10.16</a:t>
             </a:fld>
             <a:endParaRPr lang="de-DE" dirty="0"/>
           </a:p>
@@ -6276,7 +6350,7 @@
             <a:fld id="{852F18A7-60EF-DD48-8F37-BE93452F0A67}" type="datetime1">
               <a:rPr lang="de-DE" smtClean="0"/>
               <a:pPr/>
-              <a:t>26.10.2016</a:t>
+              <a:t>27.10.16</a:t>
             </a:fld>
             <a:endParaRPr lang="de-DE" dirty="0"/>
           </a:p>
@@ -6790,7 +6864,7 @@
             <a:fld id="{852F18A7-60EF-DD48-8F37-BE93452F0A67}" type="datetime1">
               <a:rPr lang="de-DE" smtClean="0"/>
               <a:pPr/>
-              <a:t>26.10.2016</a:t>
+              <a:t>27.10.16</a:t>
             </a:fld>
             <a:endParaRPr lang="de-DE" dirty="0"/>
           </a:p>
@@ -7208,7 +7282,7 @@
             <a:fld id="{8B5938FC-41F9-514F-B1BF-C7F60C0AA152}" type="datetime1">
               <a:rPr lang="de-DE" smtClean="0"/>
               <a:pPr/>
-              <a:t>26.10.2016</a:t>
+              <a:t>27.10.16</a:t>
             </a:fld>
             <a:endParaRPr lang="de-DE" dirty="0"/>
           </a:p>
@@ -7710,6 +7784,10 @@
               <a:rPr lang="de-DE" dirty="0" err="1"/>
               <a:t>Matuc</a:t>
             </a:r>
+            <a:r>
+              <a:rPr lang="de-DE" dirty="0"/>
+              <a:t/>
+            </a:r>
             <a:br>
               <a:rPr lang="de-DE" dirty="0"/>
             </a:br>
@@ -7760,6 +7838,13 @@
       </p:stSnd>
     </p:sndAc>
   </p:transition>
+  <p:timing>
+    <p:tnLst>
+      <p:par>
+        <p:cTn id="1" dur="indefinite" restart="never" nodeType="tmRoot"/>
+      </p:par>
+    </p:tnLst>
+  </p:timing>
 </p:sld>
 </file>
 
@@ -7798,7 +7883,7 @@
             <a:fld id="{852F18A7-60EF-DD48-8F37-BE93452F0A67}" type="datetime1">
               <a:rPr lang="de-DE" smtClean="0"/>
               <a:pPr/>
-              <a:t>26.10.2016</a:t>
+              <a:t>27.10.16</a:t>
             </a:fld>
             <a:endParaRPr lang="de-DE" dirty="0"/>
           </a:p>
@@ -7911,6 +7996,13 @@
   <p:transition spd="slow">
     <p:push dir="u"/>
   </p:transition>
+  <p:timing>
+    <p:tnLst>
+      <p:par>
+        <p:cTn id="1" dur="indefinite" restart="never" nodeType="tmRoot"/>
+      </p:par>
+    </p:tnLst>
+  </p:timing>
 </p:sld>
 </file>
 
@@ -7970,7 +8062,7 @@
           <a:p>
             <a:fld id="{852F18A7-60EF-DD48-8F37-BE93452F0A67}" type="datetime1">
               <a:rPr lang="de-DE" smtClean="0"/>
-              <a:t>26.10.2016</a:t>
+              <a:t>27.10.16</a:t>
             </a:fld>
             <a:endParaRPr lang="de-DE" dirty="0"/>
           </a:p>
@@ -8234,6 +8326,13 @@
   <p:transition spd="slow">
     <p:push dir="u"/>
   </p:transition>
+  <p:timing>
+    <p:tnLst>
+      <p:par>
+        <p:cTn id="1" dur="indefinite" restart="never" nodeType="tmRoot"/>
+      </p:par>
+    </p:tnLst>
+  </p:timing>
 </p:sld>
 </file>
 
@@ -8297,7 +8396,7 @@
             <a:fld id="{852F18A7-60EF-DD48-8F37-BE93452F0A67}" type="datetime1">
               <a:rPr lang="de-DE" smtClean="0"/>
               <a:pPr/>
-              <a:t>26.10.2016</a:t>
+              <a:t>27.10.16</a:t>
             </a:fld>
             <a:endParaRPr lang="de-DE" dirty="0"/>
           </a:p>
@@ -9199,7 +9298,7 @@
             <a:fld id="{852F18A7-60EF-DD48-8F37-BE93452F0A67}" type="datetime1">
               <a:rPr lang="de-DE" smtClean="0"/>
               <a:pPr/>
-              <a:t>26.10.2016</a:t>
+              <a:t>27.10.16</a:t>
             </a:fld>
             <a:endParaRPr lang="de-DE" dirty="0"/>
           </a:p>
@@ -9509,7 +9608,7 @@
             <a:fld id="{852F18A7-60EF-DD48-8F37-BE93452F0A67}" type="datetime1">
               <a:rPr lang="de-DE" smtClean="0"/>
               <a:pPr/>
-              <a:t>26.10.2016</a:t>
+              <a:t>27.10.16</a:t>
             </a:fld>
             <a:endParaRPr lang="de-DE" dirty="0"/>
           </a:p>
@@ -9559,6 +9658,13 @@
   <p:transition spd="slow">
     <p:push dir="u"/>
   </p:transition>
+  <p:timing>
+    <p:tnLst>
+      <p:par>
+        <p:cTn id="1" dur="indefinite" restart="never" nodeType="tmRoot"/>
+      </p:par>
+    </p:tnLst>
+  </p:timing>
 </p:sld>
 </file>
 
@@ -9734,7 +9840,7 @@
             <a:fld id="{852F18A7-60EF-DD48-8F37-BE93452F0A67}" type="datetime1">
               <a:rPr lang="de-DE" smtClean="0"/>
               <a:pPr/>
-              <a:t>26.10.2016</a:t>
+              <a:t>27.10.16</a:t>
             </a:fld>
             <a:endParaRPr lang="de-DE" dirty="0"/>
           </a:p>
@@ -9784,6 +9890,13 @@
   <p:transition spd="slow">
     <p:push dir="u"/>
   </p:transition>
+  <p:timing>
+    <p:tnLst>
+      <p:par>
+        <p:cTn id="1" dur="indefinite" restart="never" nodeType="tmRoot"/>
+      </p:par>
+    </p:tnLst>
+  </p:timing>
 </p:sld>
 </file>
 
@@ -9950,7 +10063,7 @@
             <a:fld id="{852F18A7-60EF-DD48-8F37-BE93452F0A67}" type="datetime1">
               <a:rPr lang="de-DE" smtClean="0"/>
               <a:pPr/>
-              <a:t>26.10.2016</a:t>
+              <a:t>27.10.16</a:t>
             </a:fld>
             <a:endParaRPr lang="de-DE" dirty="0"/>
           </a:p>
@@ -10447,7 +10560,7 @@
             <a:fld id="{852F18A7-60EF-DD48-8F37-BE93452F0A67}" type="datetime1">
               <a:rPr lang="de-DE" smtClean="0"/>
               <a:pPr/>
-              <a:t>26.10.2016</a:t>
+              <a:t>27.10.16</a:t>
             </a:fld>
             <a:endParaRPr lang="de-DE" dirty="0"/>
           </a:p>
@@ -10535,7 +10648,7 @@
             <a:fld id="{852F18A7-60EF-DD48-8F37-BE93452F0A67}" type="datetime1">
               <a:rPr lang="de-DE" smtClean="0"/>
               <a:pPr/>
-              <a:t>26.10.2016</a:t>
+              <a:t>27.10.16</a:t>
             </a:fld>
             <a:endParaRPr lang="de-DE" dirty="0"/>
           </a:p>
@@ -10796,7 +10909,7 @@
           <a:p>
             <a:fld id="{852F18A7-60EF-DD48-8F37-BE93452F0A67}" type="datetime1">
               <a:rPr lang="de-DE" smtClean="0"/>
-              <a:t>26.10.2016</a:t>
+              <a:t>27.10.16</a:t>
             </a:fld>
             <a:endParaRPr lang="de-DE" dirty="0"/>
           </a:p>
@@ -11028,7 +11141,7 @@
           <a:p>
             <a:fld id="{852F18A7-60EF-DD48-8F37-BE93452F0A67}" type="datetime1">
               <a:rPr lang="de-DE" smtClean="0"/>
-              <a:t>26.10.2016</a:t>
+              <a:t>27.10.16</a:t>
             </a:fld>
             <a:endParaRPr lang="de-DE" dirty="0"/>
           </a:p>
@@ -11078,6 +11191,13 @@
   <p:transition spd="slow">
     <p:push dir="u"/>
   </p:transition>
+  <p:timing>
+    <p:tnLst>
+      <p:par>
+        <p:cTn id="1" dur="indefinite" restart="never" nodeType="tmRoot"/>
+      </p:par>
+    </p:tnLst>
+  </p:timing>
 </p:sld>
 </file>
 
@@ -11115,7 +11235,15 @@
           <a:p>
             <a:r>
               <a:rPr lang="de-DE" dirty="0"/>
-              <a:t>Vielen Dank für die Aufmerksamkeit</a:t>
+              <a:t>Vielen Dank für </a:t>
+            </a:r>
+            <a:r>
+              <a:rPr lang="de-DE" dirty="0" smtClean="0"/>
+              <a:t>Ihre </a:t>
+            </a:r>
+            <a:r>
+              <a:rPr lang="de-DE" dirty="0"/>
+              <a:t>Aufmerksamkeit</a:t>
             </a:r>
           </a:p>
         </p:txBody>
@@ -11143,7 +11271,7 @@
             <a:fld id="{852F18A7-60EF-DD48-8F37-BE93452F0A67}" type="datetime1">
               <a:rPr lang="de-DE" smtClean="0"/>
               <a:pPr/>
-              <a:t>26.10.2016</a:t>
+              <a:t>27.10.16</a:t>
             </a:fld>
             <a:endParaRPr lang="de-DE" dirty="0"/>
           </a:p>
@@ -11242,7 +11370,7 @@
             <a:fld id="{852F18A7-60EF-DD48-8F37-BE93452F0A67}" type="datetime1">
               <a:rPr lang="de-DE" smtClean="0"/>
               <a:pPr/>
-              <a:t>26.10.2016</a:t>
+              <a:t>27.10.16</a:t>
             </a:fld>
             <a:endParaRPr lang="de-DE" dirty="0"/>
           </a:p>
@@ -11337,6 +11465,13 @@
   <p:transition spd="slow">
     <p:push dir="u"/>
   </p:transition>
+  <p:timing>
+    <p:tnLst>
+      <p:par>
+        <p:cTn id="1" dur="indefinite" restart="never" nodeType="tmRoot"/>
+      </p:par>
+    </p:tnLst>
+  </p:timing>
 </p:sld>
 </file>
 
@@ -11538,7 +11673,7 @@
           <a:p>
             <a:fld id="{852F18A7-60EF-DD48-8F37-BE93452F0A67}" type="datetime1">
               <a:rPr lang="de-DE" smtClean="0"/>
-              <a:t>26.10.2016</a:t>
+              <a:t>27.10.16</a:t>
             </a:fld>
             <a:endParaRPr lang="de-DE" dirty="0"/>
           </a:p>
@@ -11588,6 +11723,13 @@
   <p:transition spd="slow">
     <p:push dir="u"/>
   </p:transition>
+  <p:timing>
+    <p:tnLst>
+      <p:par>
+        <p:cTn id="1" dur="indefinite" restart="never" nodeType="tmRoot"/>
+      </p:par>
+    </p:tnLst>
+  </p:timing>
 </p:sld>
 </file>
 
@@ -11626,7 +11768,7 @@
             <a:fld id="{852F18A7-60EF-DD48-8F37-BE93452F0A67}" type="datetime1">
               <a:rPr lang="de-DE" smtClean="0"/>
               <a:pPr/>
-              <a:t>26.10.2016</a:t>
+              <a:t>27.10.16</a:t>
             </a:fld>
             <a:endParaRPr lang="de-DE" dirty="0"/>
           </a:p>
@@ -11721,6 +11863,13 @@
   <p:transition spd="slow">
     <p:push dir="u"/>
   </p:transition>
+  <p:timing>
+    <p:tnLst>
+      <p:par>
+        <p:cTn id="1" dur="indefinite" restart="never" nodeType="tmRoot"/>
+      </p:par>
+    </p:tnLst>
+  </p:timing>
 </p:sld>
 </file>
 
@@ -11931,7 +12080,7 @@
           <a:p>
             <a:fld id="{852F18A7-60EF-DD48-8F37-BE93452F0A67}" type="datetime1">
               <a:rPr lang="de-DE" smtClean="0"/>
-              <a:t>26.10.2016</a:t>
+              <a:t>27.10.16</a:t>
             </a:fld>
             <a:endParaRPr lang="de-DE" dirty="0"/>
           </a:p>
@@ -11981,6 +12130,13 @@
   <p:transition spd="slow">
     <p:push dir="u"/>
   </p:transition>
+  <p:timing>
+    <p:tnLst>
+      <p:par>
+        <p:cTn id="1" dur="indefinite" restart="never" nodeType="tmRoot"/>
+      </p:par>
+    </p:tnLst>
+  </p:timing>
 </p:sld>
 </file>
 
@@ -12169,7 +12325,7 @@
           <a:p>
             <a:fld id="{852F18A7-60EF-DD48-8F37-BE93452F0A67}" type="datetime1">
               <a:rPr lang="de-DE" smtClean="0"/>
-              <a:t>26.10.2016</a:t>
+              <a:t>27.10.16</a:t>
             </a:fld>
             <a:endParaRPr lang="de-DE" dirty="0"/>
           </a:p>
@@ -12219,6 +12375,13 @@
   <p:transition spd="slow">
     <p:push dir="u"/>
   </p:transition>
+  <p:timing>
+    <p:tnLst>
+      <p:par>
+        <p:cTn id="1" dur="indefinite" restart="never" nodeType="tmRoot"/>
+      </p:par>
+    </p:tnLst>
+  </p:timing>
 </p:sld>
 </file>
 
@@ -12407,7 +12570,7 @@
           <a:p>
             <a:fld id="{852F18A7-60EF-DD48-8F37-BE93452F0A67}" type="datetime1">
               <a:rPr lang="de-DE" smtClean="0"/>
-              <a:t>26.10.2016</a:t>
+              <a:t>27.10.16</a:t>
             </a:fld>
             <a:endParaRPr lang="de-DE" dirty="0"/>
           </a:p>
@@ -12487,6 +12650,13 @@
   <p:transition spd="slow">
     <p:push dir="u"/>
   </p:transition>
+  <p:timing>
+    <p:tnLst>
+      <p:par>
+        <p:cTn id="1" dur="indefinite" restart="never" nodeType="tmRoot"/>
+      </p:par>
+    </p:tnLst>
+  </p:timing>
 </p:sld>
 </file>
 
@@ -12675,7 +12845,7 @@
           <a:p>
             <a:fld id="{852F18A7-60EF-DD48-8F37-BE93452F0A67}" type="datetime1">
               <a:rPr lang="de-DE" smtClean="0"/>
-              <a:t>26.10.2016</a:t>
+              <a:t>27.10.16</a:t>
             </a:fld>
             <a:endParaRPr lang="de-DE" dirty="0"/>
           </a:p>
@@ -12760,6 +12930,13 @@
       <p:transition/>
     </mc:Fallback>
   </mc:AlternateContent>
+  <p:timing>
+    <p:tnLst>
+      <p:par>
+        <p:cTn id="1" dur="indefinite" restart="never" nodeType="tmRoot"/>
+      </p:par>
+    </p:tnLst>
+  </p:timing>
 </p:sld>
 </file>
 

</xml_diff>